<commit_message>
new forward button function
allow left mouse click to forward
instead of using just keyboard right arrow key
</commit_message>
<xml_diff>
--- a/button_design.pptx
+++ b/button_design.pptx
@@ -6,6 +6,7 @@
   </p:sldMasterIdLst>
   <p:sldIdLst>
     <p:sldId id="256" r:id="rId2"/>
+    <p:sldId id="257" r:id="rId3"/>
   </p:sldIdLst>
   <p:sldSz cx="12192000" cy="6858000"/>
   <p:notesSz cx="6858000" cy="9144000"/>
@@ -3351,8 +3352,8 @@
         </p:nvGrpSpPr>
         <p:grpSpPr>
           <a:xfrm>
-            <a:off x="2247713" y="316758"/>
-            <a:ext cx="6224483" cy="6224483"/>
+            <a:off x="3720376" y="1087120"/>
+            <a:ext cx="2375624" cy="2341880"/>
             <a:chOff x="2253884" y="1161661"/>
             <a:chExt cx="4534678" cy="4534678"/>
           </a:xfrm>
@@ -3460,10 +3461,424 @@
           </p:spPr>
         </p:pic>
       </p:grpSp>
+      <p:grpSp>
+        <p:nvGrpSpPr>
+          <p:cNvPr id="2" name="Group 1">
+            <a:extLst>
+              <a:ext uri="{FF2B5EF4-FFF2-40B4-BE49-F238E27FC236}">
+                <a16:creationId xmlns:a16="http://schemas.microsoft.com/office/drawing/2014/main" id="{2FF661A8-E8A7-C4F4-4153-C8FDFF9D59C5}"/>
+              </a:ext>
+            </a:extLst>
+          </p:cNvPr>
+          <p:cNvGrpSpPr/>
+          <p:nvPr/>
+        </p:nvGrpSpPr>
+        <p:grpSpPr>
+          <a:xfrm>
+            <a:off x="6270536" y="1087120"/>
+            <a:ext cx="2370793" cy="2341881"/>
+            <a:chOff x="2247713" y="316758"/>
+            <a:chExt cx="6224483" cy="6224483"/>
+          </a:xfrm>
+        </p:grpSpPr>
+        <p:grpSp>
+          <p:nvGrpSpPr>
+            <p:cNvPr id="3" name="Group 2">
+              <a:extLst>
+                <a:ext uri="{FF2B5EF4-FFF2-40B4-BE49-F238E27FC236}">
+                  <a16:creationId xmlns:a16="http://schemas.microsoft.com/office/drawing/2014/main" id="{FDA8D825-C6D5-947A-A553-977E6033043E}"/>
+                </a:ext>
+              </a:extLst>
+            </p:cNvPr>
+            <p:cNvGrpSpPr/>
+            <p:nvPr/>
+          </p:nvGrpSpPr>
+          <p:grpSpPr>
+            <a:xfrm>
+              <a:off x="2247713" y="316758"/>
+              <a:ext cx="6224483" cy="6224483"/>
+              <a:chOff x="2253884" y="1161661"/>
+              <a:chExt cx="4534678" cy="4534678"/>
+            </a:xfrm>
+            <a:gradFill>
+              <a:gsLst>
+                <a:gs pos="0">
+                  <a:srgbClr val="00B0F0"/>
+                </a:gs>
+                <a:gs pos="100000">
+                  <a:srgbClr val="9E00D0"/>
+                </a:gs>
+              </a:gsLst>
+              <a:lin ang="0" scaled="0"/>
+            </a:gradFill>
+          </p:grpSpPr>
+          <p:sp>
+            <p:nvSpPr>
+              <p:cNvPr id="8" name="Rectangle: Rounded Corners 7">
+                <a:extLst>
+                  <a:ext uri="{FF2B5EF4-FFF2-40B4-BE49-F238E27FC236}">
+                    <a16:creationId xmlns:a16="http://schemas.microsoft.com/office/drawing/2014/main" id="{5FDB03A2-A054-92A3-807A-D47F6994B770}"/>
+                  </a:ext>
+                </a:extLst>
+              </p:cNvPr>
+              <p:cNvSpPr/>
+              <p:nvPr/>
+            </p:nvSpPr>
+            <p:spPr>
+              <a:xfrm>
+                <a:off x="2253884" y="1161661"/>
+                <a:ext cx="4534678" cy="4534678"/>
+              </a:xfrm>
+              <a:prstGeom prst="roundRect">
+                <a:avLst>
+                  <a:gd name="adj" fmla="val 16536"/>
+                </a:avLst>
+              </a:prstGeom>
+              <a:grpFill/>
+              <a:ln>
+                <a:noFill/>
+              </a:ln>
+            </p:spPr>
+            <p:style>
+              <a:lnRef idx="2">
+                <a:schemeClr val="accent4">
+                  <a:shade val="50000"/>
+                </a:schemeClr>
+              </a:lnRef>
+              <a:fillRef idx="1">
+                <a:schemeClr val="accent4"/>
+              </a:fillRef>
+              <a:effectRef idx="0">
+                <a:schemeClr val="accent4"/>
+              </a:effectRef>
+              <a:fontRef idx="minor">
+                <a:schemeClr val="lt1"/>
+              </a:fontRef>
+            </p:style>
+            <p:txBody>
+              <a:bodyPr rtlCol="0" anchor="ctr"/>
+              <a:lstStyle/>
+              <a:p>
+                <a:pPr algn="ctr"/>
+                <a:endParaRPr lang="en-US" dirty="0"/>
+              </a:p>
+            </p:txBody>
+          </p:sp>
+          <p:pic>
+            <p:nvPicPr>
+              <p:cNvPr id="9" name="Picture 8" descr="Colourful play button vector icon. Play symbol for website design, logo,  app, UI. Vector illustration. 4435790 Vector Art at Vecteezy">
+                <a:extLst>
+                  <a:ext uri="{FF2B5EF4-FFF2-40B4-BE49-F238E27FC236}">
+                    <a16:creationId xmlns:a16="http://schemas.microsoft.com/office/drawing/2014/main" id="{0350D6D0-B4F7-5EC3-D18F-13DC461C0383}"/>
+                  </a:ext>
+                </a:extLst>
+              </p:cNvPr>
+              <p:cNvPicPr>
+                <a:picLocks noChangeAspect="1" noChangeArrowheads="1"/>
+              </p:cNvPicPr>
+              <p:nvPr/>
+            </p:nvPicPr>
+            <p:blipFill rotWithShape="1">
+              <a:blip r:embed="rId2">
+                <a:extLst>
+                  <a:ext uri="{28A0092B-C50C-407E-A947-70E740481C1C}">
+                    <a14:useLocalDpi xmlns:a14="http://schemas.microsoft.com/office/drawing/2010/main" val="0"/>
+                  </a:ext>
+                </a:extLst>
+              </a:blip>
+              <a:srcRect l="18454" t="18261" r="18358" b="18370"/>
+              <a:stretch/>
+            </p:blipFill>
+            <p:spPr bwMode="auto">
+              <a:xfrm>
+                <a:off x="2361728" y="1269000"/>
+                <a:ext cx="4318990" cy="4320000"/>
+              </a:xfrm>
+              <a:prstGeom prst="ellipse">
+                <a:avLst/>
+              </a:prstGeom>
+              <a:grpFill/>
+              <a:ln>
+                <a:noFill/>
+              </a:ln>
+            </p:spPr>
+          </p:pic>
+        </p:grpSp>
+        <p:pic>
+          <p:nvPicPr>
+            <p:cNvPr id="7" name="Picture 6">
+              <a:extLst>
+                <a:ext uri="{FF2B5EF4-FFF2-40B4-BE49-F238E27FC236}">
+                  <a16:creationId xmlns:a16="http://schemas.microsoft.com/office/drawing/2014/main" id="{0AF5C52F-C193-728A-6510-8D708540DDB5}"/>
+                </a:ext>
+              </a:extLst>
+            </p:cNvPr>
+            <p:cNvPicPr>
+              <a:picLocks noChangeAspect="1"/>
+            </p:cNvPicPr>
+            <p:nvPr/>
+          </p:nvPicPr>
+          <p:blipFill>
+            <a:blip r:embed="rId3">
+              <a:extLst>
+                <a:ext uri="{BEBA8EAE-BF5A-486C-A8C5-ECC9F3942E4B}">
+                  <a14:imgProps xmlns:a14="http://schemas.microsoft.com/office/drawing/2010/main">
+                    <a14:imgLayer r:embed="rId4">
+                      <a14:imgEffect>
+                        <a14:backgroundRemoval t="10000" b="90000" l="10000" r="90000">
+                          <a14:foregroundMark x1="47352" y1="41413" x2="47352" y2="41413"/>
+                          <a14:backgroundMark x1="15891" y1="28250" x2="23274" y2="74960"/>
+                        </a14:backgroundRemoval>
+                      </a14:imgEffect>
+                    </a14:imgLayer>
+                  </a14:imgProps>
+                </a:ext>
+                <a:ext uri="{28A0092B-C50C-407E-A947-70E740481C1C}">
+                  <a14:useLocalDpi xmlns:a14="http://schemas.microsoft.com/office/drawing/2010/main" val="0"/>
+                </a:ext>
+              </a:extLst>
+            </a:blip>
+            <a:stretch>
+              <a:fillRect/>
+            </a:stretch>
+          </p:blipFill>
+          <p:spPr>
+            <a:xfrm>
+              <a:off x="4775199" y="459828"/>
+              <a:ext cx="3010485" cy="5934075"/>
+            </a:xfrm>
+            <a:prstGeom prst="rect">
+              <a:avLst/>
+            </a:prstGeom>
+          </p:spPr>
+        </p:pic>
+      </p:grpSp>
     </p:spTree>
     <p:extLst>
       <p:ext uri="{BB962C8B-B14F-4D97-AF65-F5344CB8AC3E}">
         <p14:creationId xmlns:p14="http://schemas.microsoft.com/office/powerpoint/2010/main" val="1570374133"/>
+      </p:ext>
+    </p:extLst>
+  </p:cSld>
+  <p:clrMapOvr>
+    <a:masterClrMapping/>
+  </p:clrMapOvr>
+</p:sld>
+</file>
+
+<file path=ppt/slides/slide2.xml><?xml version="1.0" encoding="utf-8"?>
+<p:sld xmlns:a="http://schemas.openxmlformats.org/drawingml/2006/main" xmlns:r="http://schemas.openxmlformats.org/officeDocument/2006/relationships" xmlns:p="http://schemas.openxmlformats.org/presentationml/2006/main">
+  <p:cSld>
+    <p:spTree>
+      <p:nvGrpSpPr>
+        <p:cNvPr id="1" name=""/>
+        <p:cNvGrpSpPr/>
+        <p:nvPr/>
+      </p:nvGrpSpPr>
+      <p:grpSpPr>
+        <a:xfrm>
+          <a:off x="0" y="0"/>
+          <a:ext cx="0" cy="0"/>
+          <a:chOff x="0" y="0"/>
+          <a:chExt cx="0" cy="0"/>
+        </a:xfrm>
+      </p:grpSpPr>
+      <p:grpSp>
+        <p:nvGrpSpPr>
+          <p:cNvPr id="9" name="Group 8">
+            <a:extLst>
+              <a:ext uri="{FF2B5EF4-FFF2-40B4-BE49-F238E27FC236}">
+                <a16:creationId xmlns:a16="http://schemas.microsoft.com/office/drawing/2014/main" id="{C8D74B04-3184-2E39-DF49-EC7F01AB50C2}"/>
+              </a:ext>
+            </a:extLst>
+          </p:cNvPr>
+          <p:cNvGrpSpPr/>
+          <p:nvPr/>
+        </p:nvGrpSpPr>
+        <p:grpSpPr>
+          <a:xfrm>
+            <a:off x="3628364" y="1544320"/>
+            <a:ext cx="3148356" cy="3015721"/>
+            <a:chOff x="2247713" y="316758"/>
+            <a:chExt cx="6224483" cy="6224483"/>
+          </a:xfrm>
+        </p:grpSpPr>
+        <p:grpSp>
+          <p:nvGrpSpPr>
+            <p:cNvPr id="6" name="Group 5">
+              <a:extLst>
+                <a:ext uri="{FF2B5EF4-FFF2-40B4-BE49-F238E27FC236}">
+                  <a16:creationId xmlns:a16="http://schemas.microsoft.com/office/drawing/2014/main" id="{25E9DFA8-B734-090C-E5DE-BFEDD641F996}"/>
+                </a:ext>
+              </a:extLst>
+            </p:cNvPr>
+            <p:cNvGrpSpPr/>
+            <p:nvPr/>
+          </p:nvGrpSpPr>
+          <p:grpSpPr>
+            <a:xfrm>
+              <a:off x="2247713" y="316758"/>
+              <a:ext cx="6224483" cy="6224483"/>
+              <a:chOff x="2253884" y="1161661"/>
+              <a:chExt cx="4534678" cy="4534678"/>
+            </a:xfrm>
+            <a:gradFill>
+              <a:gsLst>
+                <a:gs pos="0">
+                  <a:srgbClr val="00B0F0"/>
+                </a:gs>
+                <a:gs pos="100000">
+                  <a:srgbClr val="9E00D0"/>
+                </a:gs>
+              </a:gsLst>
+              <a:lin ang="0" scaled="0"/>
+            </a:gradFill>
+          </p:grpSpPr>
+          <p:sp>
+            <p:nvSpPr>
+              <p:cNvPr id="5" name="Rectangle: Rounded Corners 4">
+                <a:extLst>
+                  <a:ext uri="{FF2B5EF4-FFF2-40B4-BE49-F238E27FC236}">
+                    <a16:creationId xmlns:a16="http://schemas.microsoft.com/office/drawing/2014/main" id="{41848ACF-A274-52C3-CAF9-1ABC3741D842}"/>
+                  </a:ext>
+                </a:extLst>
+              </p:cNvPr>
+              <p:cNvSpPr/>
+              <p:nvPr/>
+            </p:nvSpPr>
+            <p:spPr>
+              <a:xfrm>
+                <a:off x="2253884" y="1161661"/>
+                <a:ext cx="4534678" cy="4534678"/>
+              </a:xfrm>
+              <a:prstGeom prst="roundRect">
+                <a:avLst>
+                  <a:gd name="adj" fmla="val 16536"/>
+                </a:avLst>
+              </a:prstGeom>
+              <a:grpFill/>
+              <a:ln>
+                <a:noFill/>
+              </a:ln>
+            </p:spPr>
+            <p:style>
+              <a:lnRef idx="2">
+                <a:schemeClr val="accent4">
+                  <a:shade val="50000"/>
+                </a:schemeClr>
+              </a:lnRef>
+              <a:fillRef idx="1">
+                <a:schemeClr val="accent4"/>
+              </a:fillRef>
+              <a:effectRef idx="0">
+                <a:schemeClr val="accent4"/>
+              </a:effectRef>
+              <a:fontRef idx="minor">
+                <a:schemeClr val="lt1"/>
+              </a:fontRef>
+            </p:style>
+            <p:txBody>
+              <a:bodyPr rtlCol="0" anchor="ctr"/>
+              <a:lstStyle/>
+              <a:p>
+                <a:pPr algn="ctr"/>
+                <a:endParaRPr lang="en-US" dirty="0"/>
+              </a:p>
+            </p:txBody>
+          </p:sp>
+          <p:pic>
+            <p:nvPicPr>
+              <p:cNvPr id="4" name="Picture 3" descr="Colourful play button vector icon. Play symbol for website design, logo,  app, UI. Vector illustration. 4435790 Vector Art at Vecteezy">
+                <a:extLst>
+                  <a:ext uri="{FF2B5EF4-FFF2-40B4-BE49-F238E27FC236}">
+                    <a16:creationId xmlns:a16="http://schemas.microsoft.com/office/drawing/2014/main" id="{D23F1A82-883F-6170-6CDF-6A97753C8B2C}"/>
+                  </a:ext>
+                </a:extLst>
+              </p:cNvPr>
+              <p:cNvPicPr>
+                <a:picLocks noChangeAspect="1" noChangeArrowheads="1"/>
+              </p:cNvPicPr>
+              <p:nvPr/>
+            </p:nvPicPr>
+            <p:blipFill rotWithShape="1">
+              <a:blip r:embed="rId2">
+                <a:extLst>
+                  <a:ext uri="{28A0092B-C50C-407E-A947-70E740481C1C}">
+                    <a14:useLocalDpi xmlns:a14="http://schemas.microsoft.com/office/drawing/2010/main" val="0"/>
+                  </a:ext>
+                </a:extLst>
+              </a:blip>
+              <a:srcRect l="18454" t="18261" r="18358" b="18370"/>
+              <a:stretch/>
+            </p:blipFill>
+            <p:spPr bwMode="auto">
+              <a:xfrm>
+                <a:off x="2361728" y="1269000"/>
+                <a:ext cx="4318990" cy="4320000"/>
+              </a:xfrm>
+              <a:prstGeom prst="ellipse">
+                <a:avLst/>
+              </a:prstGeom>
+              <a:grpFill/>
+              <a:ln>
+                <a:noFill/>
+              </a:ln>
+            </p:spPr>
+          </p:pic>
+        </p:grpSp>
+        <p:pic>
+          <p:nvPicPr>
+            <p:cNvPr id="8" name="Picture 7">
+              <a:extLst>
+                <a:ext uri="{FF2B5EF4-FFF2-40B4-BE49-F238E27FC236}">
+                  <a16:creationId xmlns:a16="http://schemas.microsoft.com/office/drawing/2014/main" id="{B1631A8F-AC95-B296-DECA-F7C235A94B2E}"/>
+                </a:ext>
+              </a:extLst>
+            </p:cNvPr>
+            <p:cNvPicPr>
+              <a:picLocks noChangeAspect="1"/>
+            </p:cNvPicPr>
+            <p:nvPr/>
+          </p:nvPicPr>
+          <p:blipFill>
+            <a:blip r:embed="rId3">
+              <a:extLst>
+                <a:ext uri="{BEBA8EAE-BF5A-486C-A8C5-ECC9F3942E4B}">
+                  <a14:imgProps xmlns:a14="http://schemas.microsoft.com/office/drawing/2010/main">
+                    <a14:imgLayer r:embed="rId4">
+                      <a14:imgEffect>
+                        <a14:backgroundRemoval t="10000" b="90000" l="10000" r="90000">
+                          <a14:foregroundMark x1="47352" y1="41413" x2="47352" y2="41413"/>
+                          <a14:backgroundMark x1="15891" y1="28250" x2="23274" y2="74960"/>
+                        </a14:backgroundRemoval>
+                      </a14:imgEffect>
+                    </a14:imgLayer>
+                  </a14:imgProps>
+                </a:ext>
+                <a:ext uri="{28A0092B-C50C-407E-A947-70E740481C1C}">
+                  <a14:useLocalDpi xmlns:a14="http://schemas.microsoft.com/office/drawing/2010/main" val="0"/>
+                </a:ext>
+              </a:extLst>
+            </a:blip>
+            <a:stretch>
+              <a:fillRect/>
+            </a:stretch>
+          </p:blipFill>
+          <p:spPr>
+            <a:xfrm>
+              <a:off x="4775199" y="459828"/>
+              <a:ext cx="3010485" cy="5934075"/>
+            </a:xfrm>
+            <a:prstGeom prst="rect">
+              <a:avLst/>
+            </a:prstGeom>
+          </p:spPr>
+        </p:pic>
+      </p:grpSp>
+    </p:spTree>
+    <p:extLst>
+      <p:ext uri="{BB962C8B-B14F-4D97-AF65-F5344CB8AC3E}">
+        <p14:creationId xmlns:p14="http://schemas.microsoft.com/office/powerpoint/2010/main" val="829642904"/>
       </p:ext>
     </p:extLst>
   </p:cSld>

</xml_diff>